<commit_message>
Object Oriented Programming principles
</commit_message>
<xml_diff>
--- a/javascript/Javascript_5.pptx
+++ b/javascript/Javascript_5.pptx
@@ -225,7 +225,7 @@
           <a:p>
             <a:fld id="{0D0E8B87-35CF-4BD9-9B75-A6B7F1AB1E2C}" type="datetimeFigureOut">
               <a:rPr lang="en-US" smtClean="0"/>
-              <a:t>7/3/2023</a:t>
+              <a:t>9/14/2023</a:t>
             </a:fld>
             <a:endParaRPr lang="en-US"/>
           </a:p>
@@ -402,7 +402,7 @@
           <a:p>
             <a:fld id="{A332326D-A2F0-4093-98BE-D0ABF0B7E9EF}" type="datetimeFigureOut">
               <a:rPr lang="en-US" noProof="0" smtClean="0"/>
-              <a:t>7/3/2023</a:t>
+              <a:t>9/14/2023</a:t>
             </a:fld>
             <a:endParaRPr lang="en-US" noProof="0"/>
           </a:p>
@@ -3735,7 +3735,7 @@
           <a:p>
             <a:fld id="{F90A2B57-AC62-4574-AC7D-7953A169D2FB}" type="datetimeFigureOut">
               <a:rPr lang="en-US" noProof="0" smtClean="0"/>
-              <a:t>7/3/2023</a:t>
+              <a:t>9/14/2023</a:t>
             </a:fld>
             <a:endParaRPr lang="en-US" noProof="0"/>
           </a:p>
@@ -6795,7 +6795,7 @@
           <a:p>
             <a:fld id="{F90A2B57-AC62-4574-AC7D-7953A169D2FB}" type="datetimeFigureOut">
               <a:rPr lang="en-US" noProof="0" smtClean="0"/>
-              <a:t>7/3/2023</a:t>
+              <a:t>9/14/2023</a:t>
             </a:fld>
             <a:endParaRPr lang="en-US" noProof="0"/>
           </a:p>
@@ -15834,7 +15834,7 @@
           <a:p>
             <a:fld id="{F90A2B57-AC62-4574-AC7D-7953A169D2FB}" type="datetimeFigureOut">
               <a:rPr lang="en-US" noProof="0" smtClean="0"/>
-              <a:t>7/3/2023</a:t>
+              <a:t>9/14/2023</a:t>
             </a:fld>
             <a:endParaRPr lang="en-US" noProof="0"/>
           </a:p>
@@ -17873,7 +17873,7 @@
           <a:p>
             <a:fld id="{F90A2B57-AC62-4574-AC7D-7953A169D2FB}" type="datetimeFigureOut">
               <a:rPr lang="en-US" noProof="0" smtClean="0"/>
-              <a:t>7/3/2023</a:t>
+              <a:t>9/14/2023</a:t>
             </a:fld>
             <a:endParaRPr lang="en-US" noProof="0"/>
           </a:p>
@@ -20165,7 +20165,7 @@
           <a:p>
             <a:fld id="{F90A2B57-AC62-4574-AC7D-7953A169D2FB}" type="datetimeFigureOut">
               <a:rPr lang="en-US" noProof="0" smtClean="0"/>
-              <a:t>7/3/2023</a:t>
+              <a:t>9/14/2023</a:t>
             </a:fld>
             <a:endParaRPr lang="en-US" noProof="0"/>
           </a:p>
@@ -22759,7 +22759,7 @@
           <a:p>
             <a:fld id="{F90A2B57-AC62-4574-AC7D-7953A169D2FB}" type="datetimeFigureOut">
               <a:rPr lang="en-US" noProof="0" smtClean="0"/>
-              <a:t>7/3/2023</a:t>
+              <a:t>9/14/2023</a:t>
             </a:fld>
             <a:endParaRPr lang="en-US" noProof="0"/>
           </a:p>
@@ -28748,7 +28748,7 @@
           <a:p>
             <a:fld id="{F90A2B57-AC62-4574-AC7D-7953A169D2FB}" type="datetimeFigureOut">
               <a:rPr lang="en-US" noProof="0" smtClean="0"/>
-              <a:t>7/3/2023</a:t>
+              <a:t>9/14/2023</a:t>
             </a:fld>
             <a:endParaRPr lang="en-US" noProof="0"/>
           </a:p>
@@ -31284,7 +31284,7 @@
           <a:p>
             <a:fld id="{F90A2B57-AC62-4574-AC7D-7953A169D2FB}" type="datetimeFigureOut">
               <a:rPr lang="en-US" noProof="0" smtClean="0"/>
-              <a:t>7/3/2023</a:t>
+              <a:t>9/14/2023</a:t>
             </a:fld>
             <a:endParaRPr lang="en-US" noProof="0"/>
           </a:p>
@@ -32622,7 +32622,7 @@
           <a:p>
             <a:fld id="{F90A2B57-AC62-4574-AC7D-7953A169D2FB}" type="datetimeFigureOut">
               <a:rPr lang="en-US" noProof="0" smtClean="0"/>
-              <a:t>7/3/2023</a:t>
+              <a:t>9/14/2023</a:t>
             </a:fld>
             <a:endParaRPr lang="en-US" noProof="0"/>
           </a:p>
@@ -35009,7 +35009,7 @@
           <a:p>
             <a:fld id="{F90A2B57-AC62-4574-AC7D-7953A169D2FB}" type="datetimeFigureOut">
               <a:rPr lang="en-US" noProof="0" smtClean="0"/>
-              <a:t>7/3/2023</a:t>
+              <a:t>9/14/2023</a:t>
             </a:fld>
             <a:endParaRPr lang="en-US" noProof="0"/>
           </a:p>
@@ -39358,7 +39358,7 @@
           <a:p>
             <a:fld id="{F90A2B57-AC62-4574-AC7D-7953A169D2FB}" type="datetimeFigureOut">
               <a:rPr lang="en-US" noProof="0" smtClean="0"/>
-              <a:t>7/3/2023</a:t>
+              <a:t>9/14/2023</a:t>
             </a:fld>
             <a:endParaRPr lang="en-US" noProof="0"/>
           </a:p>
@@ -40165,7 +40165,15 @@
           <a:p>
             <a:r>
               <a:rPr lang="en-IN" sz="2800" dirty="0"/>
-              <a:t>In JavaScript, you can achieve polymorphism through method overriding and method overloading.</a:t>
+              <a:t>In JavaScript, you can </a:t>
+            </a:r>
+            <a:r>
+              <a:rPr lang="en-IN" sz="2800"/>
+              <a:t>achieve partially polymorphism </a:t>
+            </a:r>
+            <a:r>
+              <a:rPr lang="en-IN" sz="2800" dirty="0"/>
+              <a:t>through method overriding and method overloading.</a:t>
             </a:r>
           </a:p>
         </p:txBody>
@@ -40585,7 +40593,7 @@
         </p:nvSpPr>
         <p:spPr>
           <a:xfrm>
-            <a:off x="3879121" y="793749"/>
+            <a:off x="3917221" y="422274"/>
             <a:ext cx="7578350" cy="5749925"/>
           </a:xfrm>
         </p:spPr>
@@ -40712,6 +40720,21 @@
                 <a:latin typeface="Söhne"/>
               </a:rPr>
               <a:t>polymorphism. </a:t>
+            </a:r>
+          </a:p>
+          <a:p>
+            <a:pPr marL="457200" indent="-457200">
+              <a:buFont typeface="+mj-lt"/>
+              <a:buAutoNum type="arabicPeriod"/>
+            </a:pPr>
+            <a:r>
+              <a:rPr lang="en-US" sz="2400" dirty="0">
+                <a:solidFill>
+                  <a:srgbClr val="374151"/>
+                </a:solidFill>
+                <a:latin typeface="Söhne"/>
+              </a:rPr>
+              <a:t>Abstraction </a:t>
             </a:r>
             <a:endParaRPr lang="en-US" sz="2400" dirty="0"/>
           </a:p>

</xml_diff>